<commit_message>
Started model to be implemented in matlab
</commit_message>
<xml_diff>
--- a/Project related documents/Presentation 1/Status på prosjektoppgave 1.pptx
+++ b/Project related documents/Presentation 1/Status på prosjektoppgave 1.pptx
@@ -110,6 +110,11 @@
       </a:defRPr>
     </a:lvl9pPr>
   </p:defaultTextStyle>
+  <p:extLst>
+    <p:ext uri="{EFAFB233-063F-42B5-8137-9DF3F51BA10A}">
+      <p15:sldGuideLst xmlns:p15="http://schemas.microsoft.com/office/powerpoint/2012/main"/>
+    </p:ext>
+  </p:extLst>
 </p:presentation>
 </file>
 
@@ -126,10 +131,25 @@
   <pc:docChgLst>
     <pc:chgData name="Gustav Kollstrøm" userId="a233a2e386fa368d" providerId="LiveId" clId="{7001CA42-963D-4275-B77E-D3813B600C2D}"/>
     <pc:docChg chg="modSld">
-      <pc:chgData name="Gustav Kollstrøm" userId="a233a2e386fa368d" providerId="LiveId" clId="{7001CA42-963D-4275-B77E-D3813B600C2D}" dt="2023-09-21T11:40:25.524" v="20" actId="1076"/>
+      <pc:chgData name="Gustav Kollstrøm" userId="a233a2e386fa368d" providerId="LiveId" clId="{7001CA42-963D-4275-B77E-D3813B600C2D}" dt="2023-09-21T13:18:41.907" v="54" actId="403"/>
       <pc:docMkLst>
         <pc:docMk/>
       </pc:docMkLst>
+      <pc:sldChg chg="modSp mod">
+        <pc:chgData name="Gustav Kollstrøm" userId="a233a2e386fa368d" providerId="LiveId" clId="{7001CA42-963D-4275-B77E-D3813B600C2D}" dt="2023-09-21T13:18:41.907" v="54" actId="403"/>
+        <pc:sldMkLst>
+          <pc:docMk/>
+          <pc:sldMk cId="3254149478" sldId="256"/>
+        </pc:sldMkLst>
+        <pc:spChg chg="mod">
+          <ac:chgData name="Gustav Kollstrøm" userId="a233a2e386fa368d" providerId="LiveId" clId="{7001CA42-963D-4275-B77E-D3813B600C2D}" dt="2023-09-21T13:18:41.907" v="54" actId="403"/>
+          <ac:spMkLst>
+            <pc:docMk/>
+            <pc:sldMk cId="3254149478" sldId="256"/>
+            <ac:spMk id="3" creationId="{B6241B3E-D80A-9A55-5073-09BD86FF8971}"/>
+          </ac:spMkLst>
+        </pc:spChg>
+      </pc:sldChg>
       <pc:sldChg chg="modSp mod">
         <pc:chgData name="Gustav Kollstrøm" userId="a233a2e386fa368d" providerId="LiveId" clId="{7001CA42-963D-4275-B77E-D3813B600C2D}" dt="2023-09-21T11:40:25.524" v="20" actId="1076"/>
         <pc:sldMkLst>
@@ -3468,10 +3488,15 @@
         </p:nvSpPr>
         <p:spPr/>
         <p:txBody>
-          <a:bodyPr/>
+          <a:bodyPr>
+            <a:normAutofit/>
+          </a:bodyPr>
           <a:lstStyle/>
           <a:p>
-            <a:endParaRPr lang="en-US" dirty="0"/>
+            <a:r>
+              <a:rPr lang="en-US" sz="1800" dirty="0"/>
+              <a:t>Gustav Kollstrøm</a:t>
+            </a:r>
           </a:p>
         </p:txBody>
       </p:sp>

</xml_diff>